<commit_message>
added updated paper and presentation
</commit_message>
<xml_diff>
--- a/Papers/VC_presentation.pptx
+++ b/Papers/VC_presentation.pptx
@@ -125,7 +125,7 @@
   </p:defaultTextStyle>
   <p:extLst>
     <p:ext uri="{EFAFB233-063F-42B5-8137-9DF3F51BA10A}">
-      <p15:sldGuideLst xmlns:p15="http://schemas.microsoft.com/office/powerpoint/2012/main">
+      <p15:sldGuideLst xmlns:p15="http://schemas.microsoft.com/office/powerpoint/2012/main" xmlns="">
         <p15:guide id="1" orient="horz" pos="2160">
           <p15:clr>
             <a:srgbClr val="A4A3A4"/>
@@ -658,7 +658,7 @@
           <a:p>
             <a:fld id="{BA0B9217-7B37-47A7-9C93-52A1BB4A0DD6}" type="datetimeFigureOut">
               <a:rPr lang="en-US" smtClean="0"/>
-              <a:t>12/15/2015</a:t>
+              <a:t>12/17/15</a:t>
             </a:fld>
             <a:endParaRPr lang="en-US"/>
           </a:p>
@@ -759,7 +759,7 @@
           </a:ln>
           <a:extLst>
             <a:ext uri="{91240B29-F687-4f45-9708-019B960494DF}">
-              <a14:hiddenLine xmlns:a14="http://schemas.microsoft.com/office/drawing/2010/main" xmlns="" w="9525">
+              <a14:hiddenLine xmlns:a14="http://schemas.microsoft.com/office/drawing/2010/main" w="9525">
                 <a:solidFill>
                   <a:srgbClr val="000000"/>
                 </a:solidFill>
@@ -814,7 +814,7 @@
           </a:ln>
           <a:extLst>
             <a:ext uri="{91240B29-F687-4f45-9708-019B960494DF}">
-              <a14:hiddenLine xmlns:a14="http://schemas.microsoft.com/office/drawing/2010/main" xmlns="" w="9525">
+              <a14:hiddenLine xmlns:a14="http://schemas.microsoft.com/office/drawing/2010/main" w="9525">
                 <a:solidFill>
                   <a:srgbClr val="000000"/>
                 </a:solidFill>
@@ -1069,7 +1069,7 @@
           <a:p>
             <a:fld id="{BA0B9217-7B37-47A7-9C93-52A1BB4A0DD6}" type="datetimeFigureOut">
               <a:rPr lang="en-US" smtClean="0"/>
-              <a:t>12/15/2015</a:t>
+              <a:t>12/17/15</a:t>
             </a:fld>
             <a:endParaRPr lang="en-US"/>
           </a:p>
@@ -1317,7 +1317,7 @@
           <a:p>
             <a:fld id="{BA0B9217-7B37-47A7-9C93-52A1BB4A0DD6}" type="datetimeFigureOut">
               <a:rPr lang="en-US" smtClean="0"/>
-              <a:t>12/15/2015</a:t>
+              <a:t>12/17/15</a:t>
             </a:fld>
             <a:endParaRPr lang="en-US"/>
           </a:p>
@@ -1857,7 +1857,7 @@
           <a:p>
             <a:fld id="{BA0B9217-7B37-47A7-9C93-52A1BB4A0DD6}" type="datetimeFigureOut">
               <a:rPr lang="en-US" smtClean="0"/>
-              <a:t>12/15/2015</a:t>
+              <a:t>12/17/15</a:t>
             </a:fld>
             <a:endParaRPr lang="en-US"/>
           </a:p>
@@ -2105,7 +2105,7 @@
           <a:p>
             <a:fld id="{BA0B9217-7B37-47A7-9C93-52A1BB4A0DD6}" type="datetimeFigureOut">
               <a:rPr lang="en-US" smtClean="0"/>
-              <a:t>12/15/2015</a:t>
+              <a:t>12/17/15</a:t>
             </a:fld>
             <a:endParaRPr lang="en-US"/>
           </a:p>
@@ -2637,7 +2637,7 @@
           <a:p>
             <a:fld id="{BA0B9217-7B37-47A7-9C93-52A1BB4A0DD6}" type="datetimeFigureOut">
               <a:rPr lang="en-US" smtClean="0"/>
-              <a:t>12/15/2015</a:t>
+              <a:t>12/17/15</a:t>
             </a:fld>
             <a:endParaRPr lang="en-US"/>
           </a:p>
@@ -2934,7 +2934,7 @@
           <a:p>
             <a:fld id="{BA0B9217-7B37-47A7-9C93-52A1BB4A0DD6}" type="datetimeFigureOut">
               <a:rPr lang="en-US" smtClean="0"/>
-              <a:t>12/15/2015</a:t>
+              <a:t>12/17/15</a:t>
             </a:fld>
             <a:endParaRPr lang="en-US"/>
           </a:p>
@@ -3108,7 +3108,7 @@
           <a:p>
             <a:fld id="{BA0B9217-7B37-47A7-9C93-52A1BB4A0DD6}" type="datetimeFigureOut">
               <a:rPr lang="en-US" smtClean="0"/>
-              <a:t>12/15/2015</a:t>
+              <a:t>12/17/15</a:t>
             </a:fld>
             <a:endParaRPr lang="en-US"/>
           </a:p>
@@ -3288,7 +3288,7 @@
           <a:p>
             <a:fld id="{BA0B9217-7B37-47A7-9C93-52A1BB4A0DD6}" type="datetimeFigureOut">
               <a:rPr lang="en-US" smtClean="0"/>
-              <a:t>12/15/2015</a:t>
+              <a:t>12/17/15</a:t>
             </a:fld>
             <a:endParaRPr lang="en-US"/>
           </a:p>
@@ -3473,7 +3473,7 @@
           <a:p>
             <a:fld id="{BA0B9217-7B37-47A7-9C93-52A1BB4A0DD6}" type="datetimeFigureOut">
               <a:rPr lang="en-US" smtClean="0"/>
-              <a:t>12/15/2015</a:t>
+              <a:t>12/17/15</a:t>
             </a:fld>
             <a:endParaRPr lang="en-US"/>
           </a:p>
@@ -3729,7 +3729,7 @@
           <a:p>
             <a:fld id="{BA0B9217-7B37-47A7-9C93-52A1BB4A0DD6}" type="datetimeFigureOut">
               <a:rPr lang="en-US" smtClean="0"/>
-              <a:t>12/15/2015</a:t>
+              <a:t>12/17/15</a:t>
             </a:fld>
             <a:endParaRPr lang="en-US"/>
           </a:p>
@@ -4031,7 +4031,7 @@
           <a:p>
             <a:fld id="{BA0B9217-7B37-47A7-9C93-52A1BB4A0DD6}" type="datetimeFigureOut">
               <a:rPr lang="en-US" smtClean="0"/>
-              <a:t>12/15/2015</a:t>
+              <a:t>12/17/15</a:t>
             </a:fld>
             <a:endParaRPr lang="en-US"/>
           </a:p>
@@ -4473,7 +4473,7 @@
           <a:p>
             <a:fld id="{BA0B9217-7B37-47A7-9C93-52A1BB4A0DD6}" type="datetimeFigureOut">
               <a:rPr lang="en-US" smtClean="0"/>
-              <a:t>12/15/2015</a:t>
+              <a:t>12/17/15</a:t>
             </a:fld>
             <a:endParaRPr lang="en-US"/>
           </a:p>
@@ -4591,7 +4591,7 @@
           <a:p>
             <a:fld id="{BA0B9217-7B37-47A7-9C93-52A1BB4A0DD6}" type="datetimeFigureOut">
               <a:rPr lang="en-US" smtClean="0"/>
-              <a:t>12/15/2015</a:t>
+              <a:t>12/17/15</a:t>
             </a:fld>
             <a:endParaRPr lang="en-US"/>
           </a:p>
@@ -4686,7 +4686,7 @@
           <a:p>
             <a:fld id="{BA0B9217-7B37-47A7-9C93-52A1BB4A0DD6}" type="datetimeFigureOut">
               <a:rPr lang="en-US" smtClean="0"/>
-              <a:t>12/15/2015</a:t>
+              <a:t>12/17/15</a:t>
             </a:fld>
             <a:endParaRPr lang="en-US"/>
           </a:p>
@@ -4969,7 +4969,7 @@
           <a:p>
             <a:fld id="{BA0B9217-7B37-47A7-9C93-52A1BB4A0DD6}" type="datetimeFigureOut">
               <a:rPr lang="en-US" smtClean="0"/>
-              <a:t>12/15/2015</a:t>
+              <a:t>12/17/15</a:t>
             </a:fld>
             <a:endParaRPr lang="en-US"/>
           </a:p>
@@ -5260,7 +5260,7 @@
           <a:p>
             <a:fld id="{BA0B9217-7B37-47A7-9C93-52A1BB4A0DD6}" type="datetimeFigureOut">
               <a:rPr lang="en-US" smtClean="0"/>
-              <a:t>12/15/2015</a:t>
+              <a:t>12/17/15</a:t>
             </a:fld>
             <a:endParaRPr lang="en-US"/>
           </a:p>
@@ -5784,7 +5784,7 @@
           <a:p>
             <a:fld id="{BA0B9217-7B37-47A7-9C93-52A1BB4A0DD6}" type="datetimeFigureOut">
               <a:rPr lang="en-US" smtClean="0"/>
-              <a:t>12/15/2015</a:t>
+              <a:t>12/17/15</a:t>
             </a:fld>
             <a:endParaRPr lang="en-US"/>
           </a:p>
@@ -6350,11 +6350,7 @@
             </a:r>
             <a:r>
               <a:rPr lang="en-US" sz="2400" dirty="0" smtClean="0"/>
-              <a:t>o</a:t>
-            </a:r>
-            <a:r>
-              <a:rPr lang="en-US" sz="2400" dirty="0" smtClean="0"/>
-              <a:t>bust </a:t>
+              <a:t>obust </a:t>
             </a:r>
             <a:r>
               <a:rPr lang="en-US" sz="2400" dirty="0"/>
@@ -6387,7 +6383,11 @@
           <a:p>
             <a:r>
               <a:rPr lang="en-US" sz="2400" dirty="0" smtClean="0"/>
-              <a:t>Harrison Zhao and Andrew </a:t>
+              <a:t>Harrison </a:t>
+            </a:r>
+            <a:r>
+              <a:rPr lang="en-US" sz="2400" dirty="0" smtClean="0"/>
+              <a:t>Zhao and Andrew </a:t>
             </a:r>
             <a:r>
               <a:rPr lang="en-US" sz="2400" dirty="0" err="1" smtClean="0"/>
@@ -6410,7 +6410,7 @@
   <p:timing>
     <p:tnLst>
       <p:par>
-        <p:cTn id="1" dur="indefinite" restart="never" nodeType="tmRoot"/>
+        <p:cTn xmlns:p14="http://schemas.microsoft.com/office/powerpoint/2010/main" id="1" dur="indefinite" restart="never" nodeType="tmRoot"/>
       </p:par>
     </p:tnLst>
   </p:timing>
@@ -6529,7 +6529,7 @@
   <p:timing>
     <p:tnLst>
       <p:par>
-        <p:cTn id="1" dur="indefinite" restart="never" nodeType="tmRoot"/>
+        <p:cTn xmlns:p14="http://schemas.microsoft.com/office/powerpoint/2010/main" id="1" dur="indefinite" restart="never" nodeType="tmRoot"/>
       </p:par>
     </p:tnLst>
   </p:timing>
@@ -7461,7 +7461,7 @@
   <p:timing>
     <p:tnLst>
       <p:par>
-        <p:cTn id="1" dur="indefinite" restart="never" nodeType="tmRoot"/>
+        <p:cTn xmlns:p14="http://schemas.microsoft.com/office/powerpoint/2010/main" id="1" dur="indefinite" restart="never" nodeType="tmRoot"/>
       </p:par>
     </p:tnLst>
   </p:timing>
@@ -7632,7 +7632,7 @@
   <p:timing>
     <p:tnLst>
       <p:par>
-        <p:cTn id="1" dur="indefinite" restart="never" nodeType="tmRoot"/>
+        <p:cTn xmlns:p14="http://schemas.microsoft.com/office/powerpoint/2010/main" id="1" dur="indefinite" restart="never" nodeType="tmRoot"/>
       </p:par>
     </p:tnLst>
   </p:timing>
@@ -7786,7 +7786,7 @@
   <p:timing>
     <p:tnLst>
       <p:par>
-        <p:cTn id="1" dur="indefinite" restart="never" nodeType="tmRoot"/>
+        <p:cTn xmlns:p14="http://schemas.microsoft.com/office/powerpoint/2010/main" id="1" dur="indefinite" restart="never" nodeType="tmRoot"/>
       </p:par>
     </p:tnLst>
   </p:timing>
@@ -7855,12 +7855,6 @@
           </a:bodyPr>
           <a:lstStyle/>
           <a:p>
-            <a:pPr marL="457200" lvl="1" indent="0">
-              <a:buNone/>
-            </a:pPr>
-            <a:endParaRPr lang="en-US" sz="2600" dirty="0" smtClean="0"/>
-          </a:p>
-          <a:p>
             <a:pPr lvl="1"/>
             <a:r>
               <a:rPr lang="en-US" sz="2600" dirty="0" smtClean="0"/>
@@ -7891,10 +7885,6 @@
           </a:p>
           <a:p>
             <a:pPr lvl="1"/>
-            <a:endParaRPr lang="en-US" sz="2600" dirty="0" smtClean="0"/>
-          </a:p>
-          <a:p>
-            <a:pPr lvl="1"/>
             <a:r>
               <a:rPr lang="en-US" sz="2600" dirty="0" smtClean="0"/>
               <a:t>Insurance</a:t>
@@ -7905,13 +7895,8 @@
             <a:pPr lvl="1"/>
             <a:r>
               <a:rPr lang="en-US" sz="2600" dirty="0" smtClean="0"/>
-              <a:t>Other </a:t>
-            </a:r>
-            <a:r>
-              <a:rPr lang="en-US" sz="2600" dirty="0" smtClean="0"/>
-              <a:t>finance</a:t>
-            </a:r>
-            <a:endParaRPr lang="en-US" sz="2600" dirty="0" smtClean="0"/>
+              <a:t>Other finance</a:t>
+            </a:r>
           </a:p>
           <a:p>
             <a:pPr lvl="1"/>
@@ -7919,7 +7904,6 @@
               <a:rPr lang="en-US" sz="2600" dirty="0" smtClean="0"/>
               <a:t>Telecommunication</a:t>
             </a:r>
-            <a:endParaRPr lang="en-US" sz="2600" dirty="0" smtClean="0"/>
           </a:p>
         </p:txBody>
       </p:sp>
@@ -7936,7 +7920,7 @@
   <p:timing>
     <p:tnLst>
       <p:par>
-        <p:cTn id="1" dur="indefinite" restart="never" nodeType="tmRoot"/>
+        <p:cTn xmlns:p14="http://schemas.microsoft.com/office/powerpoint/2010/main" id="1" dur="indefinite" restart="never" nodeType="tmRoot"/>
       </p:par>
     </p:tnLst>
   </p:timing>
@@ -7979,11 +7963,7 @@
           <a:p>
             <a:r>
               <a:rPr lang="en-US" dirty="0" smtClean="0"/>
-              <a:t>PWC Historical Venture </a:t>
-            </a:r>
-            <a:r>
-              <a:rPr lang="en-US" dirty="0" smtClean="0"/>
-              <a:t>Capital</a:t>
+              <a:t>PWC Historical Venture Capital</a:t>
             </a:r>
             <a:endParaRPr lang="en-US" dirty="0"/>
           </a:p>
@@ -8034,7 +8014,7 @@
   <p:timing>
     <p:tnLst>
       <p:par>
-        <p:cTn id="1" dur="indefinite" restart="never" nodeType="tmRoot"/>
+        <p:cTn xmlns:p14="http://schemas.microsoft.com/office/powerpoint/2010/main" id="1" dur="indefinite" restart="never" nodeType="tmRoot"/>
       </p:par>
     </p:tnLst>
   </p:timing>
@@ -8075,11 +8055,7 @@
           <a:p>
             <a:r>
               <a:rPr lang="en-US" dirty="0" smtClean="0"/>
-              <a:t>Preprocessing </a:t>
-            </a:r>
-            <a:r>
-              <a:rPr lang="en-US" dirty="0" smtClean="0"/>
-              <a:t>Data - PWC</a:t>
+              <a:t>Preprocessing Data - PWC</a:t>
             </a:r>
             <a:endParaRPr lang="en-US" dirty="0"/>
           </a:p>
@@ -8110,11 +8086,7 @@
             <a:pPr lvl="1"/>
             <a:r>
               <a:rPr lang="en-US" sz="3300" dirty="0" smtClean="0"/>
-              <a:t>Formatted </a:t>
-            </a:r>
-            <a:r>
-              <a:rPr lang="en-US" sz="3300" dirty="0" smtClean="0"/>
-              <a:t>as quarterly data</a:t>
+              <a:t>Formatted as quarterly data</a:t>
             </a:r>
             <a:endParaRPr lang="en-US" sz="3300" dirty="0"/>
           </a:p>
@@ -8150,13 +8122,8 @@
             <a:pPr lvl="2"/>
             <a:r>
               <a:rPr lang="en-US" sz="2800" dirty="0" smtClean="0"/>
-              <a:t>Number of </a:t>
-            </a:r>
-            <a:r>
-              <a:rPr lang="en-US" sz="2800" dirty="0" smtClean="0"/>
-              <a:t>deals </a:t>
-            </a:r>
-            <a:endParaRPr lang="en-US" sz="2800" dirty="0" smtClean="0"/>
+              <a:t>Number of deals </a:t>
+            </a:r>
           </a:p>
           <a:p>
             <a:pPr lvl="1"/>
@@ -8192,7 +8159,7 @@
   <p:timing>
     <p:tnLst>
       <p:par>
-        <p:cTn id="1" dur="indefinite" restart="never" nodeType="tmRoot"/>
+        <p:cTn xmlns:p14="http://schemas.microsoft.com/office/powerpoint/2010/main" id="1" dur="indefinite" restart="never" nodeType="tmRoot"/>
       </p:par>
     </p:tnLst>
   </p:timing>
@@ -8289,7 +8256,7 @@
           </a:ln>
           <a:extLst>
             <a:ext uri="{53640926-AAD7-44d8-BBD7-CCE9431645EC}">
-              <a14:shadowObscured xmlns:a14="http://schemas.microsoft.com/office/drawing/2010/main" xmlns=""/>
+              <a14:shadowObscured xmlns:a14="http://schemas.microsoft.com/office/drawing/2010/main"/>
             </a:ext>
           </a:extLst>
         </p:spPr>
@@ -8307,7 +8274,7 @@
   <p:timing>
     <p:tnLst>
       <p:par>
-        <p:cTn id="1" dur="indefinite" restart="never" nodeType="tmRoot"/>
+        <p:cTn xmlns:p14="http://schemas.microsoft.com/office/powerpoint/2010/main" id="1" dur="indefinite" restart="never" nodeType="tmRoot"/>
       </p:par>
     </p:tnLst>
   </p:timing>
@@ -8353,11 +8320,7 @@
           <a:p>
             <a:r>
               <a:rPr lang="en-US" dirty="0" smtClean="0"/>
-              <a:t>Preprocessing </a:t>
-            </a:r>
-            <a:r>
-              <a:rPr lang="en-US" dirty="0" smtClean="0"/>
-              <a:t>Data - NASDAQ</a:t>
+              <a:t>Preprocessing Data - NASDAQ</a:t>
             </a:r>
             <a:endParaRPr lang="en-US" dirty="0"/>
           </a:p>
@@ -8388,11 +8351,7 @@
             <a:pPr lvl="1"/>
             <a:r>
               <a:rPr lang="en-US" sz="2600" dirty="0" smtClean="0"/>
-              <a:t>Monthly </a:t>
-            </a:r>
-            <a:r>
-              <a:rPr lang="en-US" sz="2600" dirty="0" smtClean="0"/>
-              <a:t>data converted to quarterly data</a:t>
+              <a:t>Monthly data converted to quarterly data</a:t>
             </a:r>
           </a:p>
           <a:p>
@@ -8456,7 +8415,7 @@
   <p:timing>
     <p:tnLst>
       <p:par>
-        <p:cTn id="1" dur="indefinite" restart="never" nodeType="tmRoot"/>
+        <p:cTn xmlns:p14="http://schemas.microsoft.com/office/powerpoint/2010/main" id="1" dur="indefinite" restart="never" nodeType="tmRoot"/>
       </p:par>
     </p:tnLst>
   </p:timing>
@@ -8506,7 +8465,7 @@
     </a:clrScheme>
     <a:fontScheme name="Parallax">
       <a:majorFont>
-        <a:latin typeface="Corbel" panose="020B0503020204020204"/>
+        <a:latin typeface="Corbel"/>
         <a:ea typeface=""/>
         <a:cs typeface=""/>
         <a:font script="Jpan" typeface="HGｺﾞｼｯｸM"/>
@@ -8541,7 +8500,7 @@
         <a:font script="Geor" typeface="Sylfaen"/>
       </a:majorFont>
       <a:minorFont>
-        <a:latin typeface="Corbel" panose="020B0503020204020204"/>
+        <a:latin typeface="Corbel"/>
         <a:ea typeface=""/>
         <a:cs typeface=""/>
         <a:font script="Jpan" typeface="HGｺﾞｼｯｸM"/>
@@ -8713,7 +8672,7 @@
   <a:extraClrSchemeLst/>
   <a:extLst>
     <a:ext uri="{05A4C25C-085E-4340-85A3-A5531E510DB2}">
-      <thm15:themeFamily xmlns:thm15="http://schemas.microsoft.com/office/thememl/2012/main" name="Parallax" id="{3388167B-A2EB-4685-9635-1831D9AEF8C4}" vid="{4F7A876A-7598-49CA-AFC8-8EDA2551E4A7}"/>
+      <thm15:themeFamily xmlns:thm15="http://schemas.microsoft.com/office/thememl/2012/main" xmlns="" name="Parallax" id="{3388167B-A2EB-4685-9635-1831D9AEF8C4}" vid="{4F7A876A-7598-49CA-AFC8-8EDA2551E4A7}"/>
     </a:ext>
   </a:extLst>
 </a:theme>

</xml_diff>